<commit_message>
Comentario 2 page <> ok
</commit_message>
<xml_diff>
--- a/Curso de Introdução à linguagem Scala.pptx
+++ b/Curso de Introdução à linguagem Scala.pptx
@@ -372,7 +372,7 @@
           <a:p>
             <a:fld id="{CA64F9DD-C15D-4E0C-822A-CD446CF999AE}" type="slidenum">
               <a:rPr lang="pt-BR" smtClean="0"/>
-              <a:t>‹#›</a:t>
+              <a:t>‹nº›</a:t>
             </a:fld>
             <a:endParaRPr lang="pt-BR"/>
           </a:p>
@@ -668,7 +668,7 @@
           <a:p>
             <a:fld id="{CA64F9DD-C15D-4E0C-822A-CD446CF999AE}" type="slidenum">
               <a:rPr lang="pt-BR" smtClean="0"/>
-              <a:t>‹#›</a:t>
+              <a:t>‹nº›</a:t>
             </a:fld>
             <a:endParaRPr lang="pt-BR"/>
           </a:p>
@@ -927,7 +927,7 @@
           <a:p>
             <a:fld id="{CA64F9DD-C15D-4E0C-822A-CD446CF999AE}" type="slidenum">
               <a:rPr lang="pt-BR" smtClean="0"/>
-              <a:t>‹#›</a:t>
+              <a:t>‹nº›</a:t>
             </a:fld>
             <a:endParaRPr lang="pt-BR"/>
           </a:p>
@@ -1396,7 +1396,7 @@
           <a:p>
             <a:fld id="{CA64F9DD-C15D-4E0C-822A-CD446CF999AE}" type="slidenum">
               <a:rPr lang="pt-BR" smtClean="0"/>
-              <a:t>‹#›</a:t>
+              <a:t>‹nº›</a:t>
             </a:fld>
             <a:endParaRPr lang="pt-BR"/>
           </a:p>
@@ -1576,7 +1576,7 @@
           <a:p>
             <a:fld id="{CA64F9DD-C15D-4E0C-822A-CD446CF999AE}" type="slidenum">
               <a:rPr lang="pt-BR" smtClean="0"/>
-              <a:t>‹#›</a:t>
+              <a:t>‹nº›</a:t>
             </a:fld>
             <a:endParaRPr lang="pt-BR"/>
           </a:p>
@@ -2152,7 +2152,7 @@
           <a:p>
             <a:fld id="{CA64F9DD-C15D-4E0C-822A-CD446CF999AE}" type="slidenum">
               <a:rPr lang="pt-BR" smtClean="0"/>
-              <a:t>‹#›</a:t>
+              <a:t>‹nº›</a:t>
             </a:fld>
             <a:endParaRPr lang="pt-BR"/>
           </a:p>
@@ -2484,7 +2484,7 @@
           <a:p>
             <a:fld id="{CA64F9DD-C15D-4E0C-822A-CD446CF999AE}" type="slidenum">
               <a:rPr lang="pt-BR" smtClean="0"/>
-              <a:t>‹#›</a:t>
+              <a:t>‹nº›</a:t>
             </a:fld>
             <a:endParaRPr lang="pt-BR"/>
           </a:p>
@@ -2659,7 +2659,7 @@
           <a:p>
             <a:fld id="{CA64F9DD-C15D-4E0C-822A-CD446CF999AE}" type="slidenum">
               <a:rPr lang="pt-BR" smtClean="0"/>
-              <a:t>‹#›</a:t>
+              <a:t>‹nº›</a:t>
             </a:fld>
             <a:endParaRPr lang="pt-BR"/>
           </a:p>
@@ -2839,7 +2839,7 @@
           <a:p>
             <a:fld id="{CA64F9DD-C15D-4E0C-822A-CD446CF999AE}" type="slidenum">
               <a:rPr lang="pt-BR" smtClean="0"/>
-              <a:t>‹#›</a:t>
+              <a:t>‹nº›</a:t>
             </a:fld>
             <a:endParaRPr lang="pt-BR"/>
           </a:p>
@@ -3014,7 +3014,7 @@
           <a:p>
             <a:fld id="{CA64F9DD-C15D-4E0C-822A-CD446CF999AE}" type="slidenum">
               <a:rPr lang="pt-BR" smtClean="0"/>
-              <a:t>‹#›</a:t>
+              <a:t>‹nº›</a:t>
             </a:fld>
             <a:endParaRPr lang="pt-BR"/>
           </a:p>
@@ -3271,7 +3271,7 @@
           <a:p>
             <a:fld id="{CA64F9DD-C15D-4E0C-822A-CD446CF999AE}" type="slidenum">
               <a:rPr lang="pt-BR" smtClean="0"/>
-              <a:t>‹#›</a:t>
+              <a:t>‹nº›</a:t>
             </a:fld>
             <a:endParaRPr lang="pt-BR"/>
           </a:p>
@@ -3568,7 +3568,7 @@
           <a:p>
             <a:fld id="{CA64F9DD-C15D-4E0C-822A-CD446CF999AE}" type="slidenum">
               <a:rPr lang="pt-BR" smtClean="0"/>
-              <a:t>‹#›</a:t>
+              <a:t>‹nº›</a:t>
             </a:fld>
             <a:endParaRPr lang="pt-BR"/>
           </a:p>
@@ -3998,7 +3998,7 @@
           <a:p>
             <a:fld id="{CA64F9DD-C15D-4E0C-822A-CD446CF999AE}" type="slidenum">
               <a:rPr lang="pt-BR" smtClean="0"/>
-              <a:t>‹#›</a:t>
+              <a:t>‹nº›</a:t>
             </a:fld>
             <a:endParaRPr lang="pt-BR"/>
           </a:p>
@@ -4116,7 +4116,7 @@
           <a:p>
             <a:fld id="{CA64F9DD-C15D-4E0C-822A-CD446CF999AE}" type="slidenum">
               <a:rPr lang="pt-BR" smtClean="0"/>
-              <a:t>‹#›</a:t>
+              <a:t>‹nº›</a:t>
             </a:fld>
             <a:endParaRPr lang="pt-BR"/>
           </a:p>
@@ -4211,7 +4211,7 @@
           <a:p>
             <a:fld id="{CA64F9DD-C15D-4E0C-822A-CD446CF999AE}" type="slidenum">
               <a:rPr lang="pt-BR" smtClean="0"/>
-              <a:t>‹#›</a:t>
+              <a:t>‹nº›</a:t>
             </a:fld>
             <a:endParaRPr lang="pt-BR"/>
           </a:p>
@@ -4494,7 +4494,7 @@
           <a:p>
             <a:fld id="{CA64F9DD-C15D-4E0C-822A-CD446CF999AE}" type="slidenum">
               <a:rPr lang="pt-BR" smtClean="0"/>
-              <a:t>‹#›</a:t>
+              <a:t>‹nº›</a:t>
             </a:fld>
             <a:endParaRPr lang="pt-BR"/>
           </a:p>
@@ -4795,7 +4795,7 @@
           <a:p>
             <a:fld id="{CA64F9DD-C15D-4E0C-822A-CD446CF999AE}" type="slidenum">
               <a:rPr lang="pt-BR" smtClean="0"/>
-              <a:t>‹#›</a:t>
+              <a:t>‹nº›</a:t>
             </a:fld>
             <a:endParaRPr lang="pt-BR"/>
           </a:p>
@@ -5068,7 +5068,7 @@
           <a:p>
             <a:fld id="{CA64F9DD-C15D-4E0C-822A-CD446CF999AE}" type="slidenum">
               <a:rPr lang="pt-BR" smtClean="0"/>
-              <a:t>‹#›</a:t>
+              <a:t>‹nº›</a:t>
             </a:fld>
             <a:endParaRPr lang="pt-BR"/>
           </a:p>
@@ -5864,7 +5864,17 @@
           <a:p>
             <a:r>
               <a:rPr lang="pt-BR" dirty="0" smtClean="0"/>
-              <a:t>[Colocar aqui um texto com a parte introdutória do curso]</a:t>
+              <a:t>[Colocar aqui um texto com a parte introdutória do curso</a:t>
+            </a:r>
+            <a:r>
+              <a:rPr lang="pt-BR" dirty="0" smtClean="0"/>
+              <a:t>]</a:t>
+            </a:r>
+          </a:p>
+          <a:p>
+            <a:r>
+              <a:rPr lang="pt-BR" smtClean="0"/>
+              <a:t>Sexta-feira 30 :D</a:t>
             </a:r>
             <a:endParaRPr lang="pt-BR" dirty="0"/>
           </a:p>

</xml_diff>

<commit_message>
alterado novamente slide 2
</commit_message>
<xml_diff>
--- a/Curso de Introdução à linguagem Scala.pptx
+++ b/Curso de Introdução à linguagem Scala.pptx
@@ -375,7 +375,7 @@
           <a:p>
             <a:fld id="{CA64F9DD-C15D-4E0C-822A-CD446CF999AE}" type="slidenum">
               <a:rPr lang="pt-BR" smtClean="0"/>
-              <a:t>‹nº›</a:t>
+              <a:t>‹#›</a:t>
             </a:fld>
             <a:endParaRPr lang="pt-BR"/>
           </a:p>
@@ -671,7 +671,7 @@
           <a:p>
             <a:fld id="{CA64F9DD-C15D-4E0C-822A-CD446CF999AE}" type="slidenum">
               <a:rPr lang="pt-BR" smtClean="0"/>
-              <a:t>‹nº›</a:t>
+              <a:t>‹#›</a:t>
             </a:fld>
             <a:endParaRPr lang="pt-BR"/>
           </a:p>
@@ -930,7 +930,7 @@
           <a:p>
             <a:fld id="{CA64F9DD-C15D-4E0C-822A-CD446CF999AE}" type="slidenum">
               <a:rPr lang="pt-BR" smtClean="0"/>
-              <a:t>‹nº›</a:t>
+              <a:t>‹#›</a:t>
             </a:fld>
             <a:endParaRPr lang="pt-BR"/>
           </a:p>
@@ -1399,7 +1399,7 @@
           <a:p>
             <a:fld id="{CA64F9DD-C15D-4E0C-822A-CD446CF999AE}" type="slidenum">
               <a:rPr lang="pt-BR" smtClean="0"/>
-              <a:t>‹nº›</a:t>
+              <a:t>‹#›</a:t>
             </a:fld>
             <a:endParaRPr lang="pt-BR"/>
           </a:p>
@@ -1579,7 +1579,7 @@
           <a:p>
             <a:fld id="{CA64F9DD-C15D-4E0C-822A-CD446CF999AE}" type="slidenum">
               <a:rPr lang="pt-BR" smtClean="0"/>
-              <a:t>‹nº›</a:t>
+              <a:t>‹#›</a:t>
             </a:fld>
             <a:endParaRPr lang="pt-BR"/>
           </a:p>
@@ -2155,7 +2155,7 @@
           <a:p>
             <a:fld id="{CA64F9DD-C15D-4E0C-822A-CD446CF999AE}" type="slidenum">
               <a:rPr lang="pt-BR" smtClean="0"/>
-              <a:t>‹nº›</a:t>
+              <a:t>‹#›</a:t>
             </a:fld>
             <a:endParaRPr lang="pt-BR"/>
           </a:p>
@@ -2487,7 +2487,7 @@
           <a:p>
             <a:fld id="{CA64F9DD-C15D-4E0C-822A-CD446CF999AE}" type="slidenum">
               <a:rPr lang="pt-BR" smtClean="0"/>
-              <a:t>‹nº›</a:t>
+              <a:t>‹#›</a:t>
             </a:fld>
             <a:endParaRPr lang="pt-BR"/>
           </a:p>
@@ -2662,7 +2662,7 @@
           <a:p>
             <a:fld id="{CA64F9DD-C15D-4E0C-822A-CD446CF999AE}" type="slidenum">
               <a:rPr lang="pt-BR" smtClean="0"/>
-              <a:t>‹nº›</a:t>
+              <a:t>‹#›</a:t>
             </a:fld>
             <a:endParaRPr lang="pt-BR"/>
           </a:p>
@@ -2842,7 +2842,7 @@
           <a:p>
             <a:fld id="{CA64F9DD-C15D-4E0C-822A-CD446CF999AE}" type="slidenum">
               <a:rPr lang="pt-BR" smtClean="0"/>
-              <a:t>‹nº›</a:t>
+              <a:t>‹#›</a:t>
             </a:fld>
             <a:endParaRPr lang="pt-BR"/>
           </a:p>
@@ -3017,7 +3017,7 @@
           <a:p>
             <a:fld id="{CA64F9DD-C15D-4E0C-822A-CD446CF999AE}" type="slidenum">
               <a:rPr lang="pt-BR" smtClean="0"/>
-              <a:t>‹nº›</a:t>
+              <a:t>‹#›</a:t>
             </a:fld>
             <a:endParaRPr lang="pt-BR"/>
           </a:p>
@@ -3274,7 +3274,7 @@
           <a:p>
             <a:fld id="{CA64F9DD-C15D-4E0C-822A-CD446CF999AE}" type="slidenum">
               <a:rPr lang="pt-BR" smtClean="0"/>
-              <a:t>‹nº›</a:t>
+              <a:t>‹#›</a:t>
             </a:fld>
             <a:endParaRPr lang="pt-BR"/>
           </a:p>
@@ -3571,7 +3571,7 @@
           <a:p>
             <a:fld id="{CA64F9DD-C15D-4E0C-822A-CD446CF999AE}" type="slidenum">
               <a:rPr lang="pt-BR" smtClean="0"/>
-              <a:t>‹nº›</a:t>
+              <a:t>‹#›</a:t>
             </a:fld>
             <a:endParaRPr lang="pt-BR"/>
           </a:p>
@@ -4001,7 +4001,7 @@
           <a:p>
             <a:fld id="{CA64F9DD-C15D-4E0C-822A-CD446CF999AE}" type="slidenum">
               <a:rPr lang="pt-BR" smtClean="0"/>
-              <a:t>‹nº›</a:t>
+              <a:t>‹#›</a:t>
             </a:fld>
             <a:endParaRPr lang="pt-BR"/>
           </a:p>
@@ -4119,7 +4119,7 @@
           <a:p>
             <a:fld id="{CA64F9DD-C15D-4E0C-822A-CD446CF999AE}" type="slidenum">
               <a:rPr lang="pt-BR" smtClean="0"/>
-              <a:t>‹nº›</a:t>
+              <a:t>‹#›</a:t>
             </a:fld>
             <a:endParaRPr lang="pt-BR"/>
           </a:p>
@@ -4214,7 +4214,7 @@
           <a:p>
             <a:fld id="{CA64F9DD-C15D-4E0C-822A-CD446CF999AE}" type="slidenum">
               <a:rPr lang="pt-BR" smtClean="0"/>
-              <a:t>‹nº›</a:t>
+              <a:t>‹#›</a:t>
             </a:fld>
             <a:endParaRPr lang="pt-BR"/>
           </a:p>
@@ -4497,7 +4497,7 @@
           <a:p>
             <a:fld id="{CA64F9DD-C15D-4E0C-822A-CD446CF999AE}" type="slidenum">
               <a:rPr lang="pt-BR" smtClean="0"/>
-              <a:t>‹nº›</a:t>
+              <a:t>‹#›</a:t>
             </a:fld>
             <a:endParaRPr lang="pt-BR"/>
           </a:p>
@@ -4798,7 +4798,7 @@
           <a:p>
             <a:fld id="{CA64F9DD-C15D-4E0C-822A-CD446CF999AE}" type="slidenum">
               <a:rPr lang="pt-BR" smtClean="0"/>
-              <a:t>‹nº›</a:t>
+              <a:t>‹#›</a:t>
             </a:fld>
             <a:endParaRPr lang="pt-BR"/>
           </a:p>
@@ -5071,7 +5071,7 @@
           <a:p>
             <a:fld id="{CA64F9DD-C15D-4E0C-822A-CD446CF999AE}" type="slidenum">
               <a:rPr lang="pt-BR" smtClean="0"/>
-              <a:t>‹nº›</a:t>
+              <a:t>‹#›</a:t>
             </a:fld>
             <a:endParaRPr lang="pt-BR"/>
           </a:p>
@@ -5844,11 +5844,11 @@
           <a:p>
             <a:r>
               <a:rPr lang="pt-BR" dirty="0" smtClean="0"/>
-              <a:t>Aletrado </a:t>
+              <a:t>Alterado novamente slide </a:t>
             </a:r>
             <a:r>
               <a:rPr lang="pt-BR" dirty="0" smtClean="0"/>
-              <a:t>slide 2</a:t>
+              <a:t>2</a:t>
             </a:r>
             <a:endParaRPr lang="pt-BR" dirty="0"/>
           </a:p>
@@ -5871,7 +5871,7 @@
           <a:p>
             <a:r>
               <a:rPr lang="pt-BR" smtClean="0"/>
-              <a:t>alterado</a:t>
+              <a:t>Alterado novamente</a:t>
             </a:r>
             <a:endParaRPr lang="pt-BR" dirty="0"/>
           </a:p>

</xml_diff>

<commit_message>
Elton se vc viu isso entao funcionou kkk
</commit_message>
<xml_diff>
--- a/Curso de Introdução à linguagem Scala.pptx
+++ b/Curso de Introdução à linguagem Scala.pptx
@@ -6,13 +6,14 @@
   </p:sldMasterIdLst>
   <p:sldIdLst>
     <p:sldId id="256" r:id="rId2"/>
-    <p:sldId id="262" r:id="rId3"/>
-    <p:sldId id="257" r:id="rId4"/>
-    <p:sldId id="264" r:id="rId5"/>
-    <p:sldId id="258" r:id="rId6"/>
-    <p:sldId id="259" r:id="rId7"/>
-    <p:sldId id="260" r:id="rId8"/>
-    <p:sldId id="261" r:id="rId9"/>
+    <p:sldId id="265" r:id="rId3"/>
+    <p:sldId id="262" r:id="rId4"/>
+    <p:sldId id="257" r:id="rId5"/>
+    <p:sldId id="264" r:id="rId6"/>
+    <p:sldId id="258" r:id="rId7"/>
+    <p:sldId id="259" r:id="rId8"/>
+    <p:sldId id="260" r:id="rId9"/>
+    <p:sldId id="261" r:id="rId10"/>
   </p:sldIdLst>
   <p:sldSz cx="12192000" cy="6858000"/>
   <p:notesSz cx="6858000" cy="9144000"/>
@@ -332,7 +333,7 @@
           <a:p>
             <a:fld id="{050F6DEB-2DF2-49A6-A845-919113FB86AE}" type="datetimeFigureOut">
               <a:rPr lang="pt-BR" smtClean="0"/>
-              <a:t>30/10/2015</a:t>
+              <a:t>31/10/2015</a:t>
             </a:fld>
             <a:endParaRPr lang="pt-BR"/>
           </a:p>
@@ -628,7 +629,7 @@
           <a:p>
             <a:fld id="{050F6DEB-2DF2-49A6-A845-919113FB86AE}" type="datetimeFigureOut">
               <a:rPr lang="pt-BR" smtClean="0"/>
-              <a:t>30/10/2015</a:t>
+              <a:t>31/10/2015</a:t>
             </a:fld>
             <a:endParaRPr lang="pt-BR"/>
           </a:p>
@@ -887,7 +888,7 @@
           <a:p>
             <a:fld id="{050F6DEB-2DF2-49A6-A845-919113FB86AE}" type="datetimeFigureOut">
               <a:rPr lang="pt-BR" smtClean="0"/>
-              <a:t>30/10/2015</a:t>
+              <a:t>31/10/2015</a:t>
             </a:fld>
             <a:endParaRPr lang="pt-BR"/>
           </a:p>
@@ -1356,7 +1357,7 @@
           <a:p>
             <a:fld id="{050F6DEB-2DF2-49A6-A845-919113FB86AE}" type="datetimeFigureOut">
               <a:rPr lang="pt-BR" smtClean="0"/>
-              <a:t>30/10/2015</a:t>
+              <a:t>31/10/2015</a:t>
             </a:fld>
             <a:endParaRPr lang="pt-BR"/>
           </a:p>
@@ -1536,7 +1537,7 @@
           <a:p>
             <a:fld id="{050F6DEB-2DF2-49A6-A845-919113FB86AE}" type="datetimeFigureOut">
               <a:rPr lang="pt-BR" smtClean="0"/>
-              <a:t>30/10/2015</a:t>
+              <a:t>31/10/2015</a:t>
             </a:fld>
             <a:endParaRPr lang="pt-BR"/>
           </a:p>
@@ -2112,7 +2113,7 @@
           <a:p>
             <a:fld id="{050F6DEB-2DF2-49A6-A845-919113FB86AE}" type="datetimeFigureOut">
               <a:rPr lang="pt-BR" smtClean="0"/>
-              <a:t>30/10/2015</a:t>
+              <a:t>31/10/2015</a:t>
             </a:fld>
             <a:endParaRPr lang="pt-BR"/>
           </a:p>
@@ -2444,7 +2445,7 @@
           <a:p>
             <a:fld id="{050F6DEB-2DF2-49A6-A845-919113FB86AE}" type="datetimeFigureOut">
               <a:rPr lang="pt-BR" smtClean="0"/>
-              <a:t>30/10/2015</a:t>
+              <a:t>31/10/2015</a:t>
             </a:fld>
             <a:endParaRPr lang="pt-BR"/>
           </a:p>
@@ -2619,7 +2620,7 @@
           <a:p>
             <a:fld id="{050F6DEB-2DF2-49A6-A845-919113FB86AE}" type="datetimeFigureOut">
               <a:rPr lang="pt-BR" smtClean="0"/>
-              <a:t>30/10/2015</a:t>
+              <a:t>31/10/2015</a:t>
             </a:fld>
             <a:endParaRPr lang="pt-BR"/>
           </a:p>
@@ -2799,7 +2800,7 @@
           <a:p>
             <a:fld id="{050F6DEB-2DF2-49A6-A845-919113FB86AE}" type="datetimeFigureOut">
               <a:rPr lang="pt-BR" smtClean="0"/>
-              <a:t>30/10/2015</a:t>
+              <a:t>31/10/2015</a:t>
             </a:fld>
             <a:endParaRPr lang="pt-BR"/>
           </a:p>
@@ -2974,7 +2975,7 @@
           <a:p>
             <a:fld id="{050F6DEB-2DF2-49A6-A845-919113FB86AE}" type="datetimeFigureOut">
               <a:rPr lang="pt-BR" smtClean="0"/>
-              <a:t>30/10/2015</a:t>
+              <a:t>31/10/2015</a:t>
             </a:fld>
             <a:endParaRPr lang="pt-BR"/>
           </a:p>
@@ -3231,7 +3232,7 @@
           <a:p>
             <a:fld id="{050F6DEB-2DF2-49A6-A845-919113FB86AE}" type="datetimeFigureOut">
               <a:rPr lang="pt-BR" smtClean="0"/>
-              <a:t>30/10/2015</a:t>
+              <a:t>31/10/2015</a:t>
             </a:fld>
             <a:endParaRPr lang="pt-BR"/>
           </a:p>
@@ -3528,7 +3529,7 @@
           <a:p>
             <a:fld id="{050F6DEB-2DF2-49A6-A845-919113FB86AE}" type="datetimeFigureOut">
               <a:rPr lang="pt-BR" smtClean="0"/>
-              <a:t>30/10/2015</a:t>
+              <a:t>31/10/2015</a:t>
             </a:fld>
             <a:endParaRPr lang="pt-BR"/>
           </a:p>
@@ -3958,7 +3959,7 @@
           <a:p>
             <a:fld id="{050F6DEB-2DF2-49A6-A845-919113FB86AE}" type="datetimeFigureOut">
               <a:rPr lang="pt-BR" smtClean="0"/>
-              <a:t>30/10/2015</a:t>
+              <a:t>31/10/2015</a:t>
             </a:fld>
             <a:endParaRPr lang="pt-BR"/>
           </a:p>
@@ -4076,7 +4077,7 @@
           <a:p>
             <a:fld id="{050F6DEB-2DF2-49A6-A845-919113FB86AE}" type="datetimeFigureOut">
               <a:rPr lang="pt-BR" smtClean="0"/>
-              <a:t>30/10/2015</a:t>
+              <a:t>31/10/2015</a:t>
             </a:fld>
             <a:endParaRPr lang="pt-BR"/>
           </a:p>
@@ -4171,7 +4172,7 @@
           <a:p>
             <a:fld id="{050F6DEB-2DF2-49A6-A845-919113FB86AE}" type="datetimeFigureOut">
               <a:rPr lang="pt-BR" smtClean="0"/>
-              <a:t>30/10/2015</a:t>
+              <a:t>31/10/2015</a:t>
             </a:fld>
             <a:endParaRPr lang="pt-BR"/>
           </a:p>
@@ -4454,7 +4455,7 @@
           <a:p>
             <a:fld id="{050F6DEB-2DF2-49A6-A845-919113FB86AE}" type="datetimeFigureOut">
               <a:rPr lang="pt-BR" smtClean="0"/>
-              <a:t>30/10/2015</a:t>
+              <a:t>31/10/2015</a:t>
             </a:fld>
             <a:endParaRPr lang="pt-BR"/>
           </a:p>
@@ -4745,7 +4746,7 @@
           <a:p>
             <a:fld id="{050F6DEB-2DF2-49A6-A845-919113FB86AE}" type="datetimeFigureOut">
               <a:rPr lang="pt-BR" smtClean="0"/>
-              <a:t>30/10/2015</a:t>
+              <a:t>31/10/2015</a:t>
             </a:fld>
             <a:endParaRPr lang="pt-BR"/>
           </a:p>
@@ -4976,7 +4977,7 @@
           <a:p>
             <a:fld id="{050F6DEB-2DF2-49A6-A845-919113FB86AE}" type="datetimeFigureOut">
               <a:rPr lang="pt-BR" smtClean="0"/>
-              <a:t>30/10/2015</a:t>
+              <a:t>31/10/2015</a:t>
             </a:fld>
             <a:endParaRPr lang="pt-BR"/>
           </a:p>
@@ -5843,7 +5844,15 @@
           <a:p>
             <a:r>
               <a:rPr lang="pt-BR" dirty="0" smtClean="0"/>
-              <a:t>Teste</a:t>
+              <a:t>Elton, s </a:t>
+            </a:r>
+            <a:r>
+              <a:rPr lang="pt-BR" dirty="0" err="1" smtClean="0"/>
+              <a:t>vc</a:t>
+            </a:r>
+            <a:r>
+              <a:rPr lang="pt-BR" dirty="0" smtClean="0"/>
+              <a:t> viu esse slide então funcionou</a:t>
             </a:r>
             <a:endParaRPr lang="pt-BR" dirty="0"/>
           </a:p>
@@ -5865,17 +5874,17 @@
           <a:lstStyle/>
           <a:p>
             <a:r>
-              <a:rPr lang="pt-BR" dirty="0" err="1" smtClean="0"/>
-              <a:t>aowwww</a:t>
-            </a:r>
-            <a:endParaRPr lang="pt-BR" dirty="0"/>
+              <a:rPr lang="pt-BR" smtClean="0"/>
+              <a:t>123</a:t>
+            </a:r>
+            <a:endParaRPr lang="pt-BR"/>
           </a:p>
         </p:txBody>
       </p:sp>
     </p:spTree>
     <p:extLst>
       <p:ext uri="{BB962C8B-B14F-4D97-AF65-F5344CB8AC3E}">
-        <p14:creationId xmlns:p14="http://schemas.microsoft.com/office/powerpoint/2010/main" val="4191969745"/>
+        <p14:creationId xmlns:p14="http://schemas.microsoft.com/office/powerpoint/2010/main" val="3296201914"/>
       </p:ext>
     </p:extLst>
   </p:cSld>
@@ -5919,7 +5928,7 @@
           <a:p>
             <a:r>
               <a:rPr lang="pt-BR" dirty="0" smtClean="0"/>
-              <a:t>Introdução</a:t>
+              <a:t>Teste</a:t>
             </a:r>
             <a:endParaRPr lang="pt-BR" dirty="0"/>
           </a:p>
@@ -5941,8 +5950,8 @@
           <a:lstStyle/>
           <a:p>
             <a:r>
-              <a:rPr lang="pt-BR" dirty="0" smtClean="0"/>
-              <a:t>[Colocar aqui um texto com a parte introdutória do curso]</a:t>
+              <a:rPr lang="pt-BR" dirty="0" err="1" smtClean="0"/>
+              <a:t>aowwww</a:t>
             </a:r>
             <a:endParaRPr lang="pt-BR" dirty="0"/>
           </a:p>
@@ -5951,7 +5960,7 @@
     </p:spTree>
     <p:extLst>
       <p:ext uri="{BB962C8B-B14F-4D97-AF65-F5344CB8AC3E}">
-        <p14:creationId xmlns:p14="http://schemas.microsoft.com/office/powerpoint/2010/main" val="2930776956"/>
+        <p14:creationId xmlns:p14="http://schemas.microsoft.com/office/powerpoint/2010/main" val="4191969745"/>
       </p:ext>
     </p:extLst>
   </p:cSld>
@@ -5995,7 +6004,7 @@
           <a:p>
             <a:r>
               <a:rPr lang="pt-BR" dirty="0" smtClean="0"/>
-              <a:t>Slide 5</a:t>
+              <a:t>Introdução</a:t>
             </a:r>
             <a:endParaRPr lang="pt-BR" dirty="0"/>
           </a:p>
@@ -6017,17 +6026,17 @@
           <a:lstStyle/>
           <a:p>
             <a:r>
-              <a:rPr lang="pt-BR" smtClean="0"/>
-              <a:t>rtygh</a:t>
-            </a:r>
-            <a:endParaRPr lang="pt-BR"/>
+              <a:rPr lang="pt-BR" dirty="0" smtClean="0"/>
+              <a:t>[Colocar aqui um texto com a parte introdutória do curso]</a:t>
+            </a:r>
+            <a:endParaRPr lang="pt-BR" dirty="0"/>
           </a:p>
         </p:txBody>
       </p:sp>
     </p:spTree>
     <p:extLst>
       <p:ext uri="{BB962C8B-B14F-4D97-AF65-F5344CB8AC3E}">
-        <p14:creationId xmlns:p14="http://schemas.microsoft.com/office/powerpoint/2010/main" val="934884477"/>
+        <p14:creationId xmlns:p14="http://schemas.microsoft.com/office/powerpoint/2010/main" val="2930776956"/>
       </p:ext>
     </p:extLst>
   </p:cSld>
@@ -6071,7 +6080,7 @@
           <a:p>
             <a:r>
               <a:rPr lang="pt-BR" dirty="0" smtClean="0"/>
-              <a:t>[Tópicos]</a:t>
+              <a:t>Slide 5</a:t>
             </a:r>
             <a:endParaRPr lang="pt-BR" dirty="0"/>
           </a:p>
@@ -6093,17 +6102,17 @@
           <a:lstStyle/>
           <a:p>
             <a:r>
-              <a:rPr lang="pt-BR" dirty="0" smtClean="0"/>
-              <a:t>[Aqui cada um coloca sua parte do trabalho(com o seu devido tópico, prestar atenção na numeração dos tópicos, se existir), na sua respectiva ordem e já formatando conforme combinado]</a:t>
-            </a:r>
-            <a:endParaRPr lang="pt-BR" dirty="0"/>
+              <a:rPr lang="pt-BR" smtClean="0"/>
+              <a:t>rtygh</a:t>
+            </a:r>
+            <a:endParaRPr lang="pt-BR"/>
           </a:p>
         </p:txBody>
       </p:sp>
     </p:spTree>
     <p:extLst>
       <p:ext uri="{BB962C8B-B14F-4D97-AF65-F5344CB8AC3E}">
-        <p14:creationId xmlns:p14="http://schemas.microsoft.com/office/powerpoint/2010/main" val="1919137567"/>
+        <p14:creationId xmlns:p14="http://schemas.microsoft.com/office/powerpoint/2010/main" val="934884477"/>
       </p:ext>
     </p:extLst>
   </p:cSld>
@@ -6147,7 +6156,7 @@
           <a:p>
             <a:r>
               <a:rPr lang="pt-BR" dirty="0" smtClean="0"/>
-              <a:t>Conclusão</a:t>
+              <a:t>[Tópicos]</a:t>
             </a:r>
             <a:endParaRPr lang="pt-BR" dirty="0"/>
           </a:p>
@@ -6170,10 +6179,8 @@
           <a:p>
             <a:r>
               <a:rPr lang="pt-BR" dirty="0" smtClean="0"/>
-              <a:t>[Colocar aqui um texto com a parte da conclusão do curso]</a:t>
-            </a:r>
-          </a:p>
-          <a:p>
+              <a:t>[Aqui cada um coloca sua parte do trabalho(com o seu devido tópico, prestar atenção na numeração dos tópicos, se existir), na sua respectiva ordem e já formatando conforme combinado]</a:t>
+            </a:r>
             <a:endParaRPr lang="pt-BR" dirty="0"/>
           </a:p>
         </p:txBody>
@@ -6181,7 +6188,7 @@
     </p:spTree>
     <p:extLst>
       <p:ext uri="{BB962C8B-B14F-4D97-AF65-F5344CB8AC3E}">
-        <p14:creationId xmlns:p14="http://schemas.microsoft.com/office/powerpoint/2010/main" val="142990780"/>
+        <p14:creationId xmlns:p14="http://schemas.microsoft.com/office/powerpoint/2010/main" val="1919137567"/>
       </p:ext>
     </p:extLst>
   </p:cSld>
@@ -6225,6 +6232,84 @@
           <a:p>
             <a:r>
               <a:rPr lang="pt-BR" dirty="0" smtClean="0"/>
+              <a:t>Conclusão</a:t>
+            </a:r>
+            <a:endParaRPr lang="pt-BR" dirty="0"/>
+          </a:p>
+        </p:txBody>
+      </p:sp>
+      <p:sp>
+        <p:nvSpPr>
+          <p:cNvPr id="3" name="Content Placeholder 2"/>
+          <p:cNvSpPr>
+            <a:spLocks noGrp="1"/>
+          </p:cNvSpPr>
+          <p:nvPr>
+            <p:ph idx="1"/>
+          </p:nvPr>
+        </p:nvSpPr>
+        <p:spPr/>
+        <p:txBody>
+          <a:bodyPr/>
+          <a:lstStyle/>
+          <a:p>
+            <a:r>
+              <a:rPr lang="pt-BR" dirty="0" smtClean="0"/>
+              <a:t>[Colocar aqui um texto com a parte da conclusão do curso]</a:t>
+            </a:r>
+          </a:p>
+          <a:p>
+            <a:endParaRPr lang="pt-BR" dirty="0"/>
+          </a:p>
+        </p:txBody>
+      </p:sp>
+    </p:spTree>
+    <p:extLst>
+      <p:ext uri="{BB962C8B-B14F-4D97-AF65-F5344CB8AC3E}">
+        <p14:creationId xmlns:p14="http://schemas.microsoft.com/office/powerpoint/2010/main" val="142990780"/>
+      </p:ext>
+    </p:extLst>
+  </p:cSld>
+  <p:clrMapOvr>
+    <a:masterClrMapping/>
+  </p:clrMapOvr>
+</p:sld>
+</file>
+
+<file path=ppt/slides/slide8.xml><?xml version="1.0" encoding="utf-8"?>
+<p:sld xmlns:a="http://schemas.openxmlformats.org/drawingml/2006/main" xmlns:r="http://schemas.openxmlformats.org/officeDocument/2006/relationships" xmlns:p="http://schemas.openxmlformats.org/presentationml/2006/main">
+  <p:cSld>
+    <p:spTree>
+      <p:nvGrpSpPr>
+        <p:cNvPr id="1" name=""/>
+        <p:cNvGrpSpPr/>
+        <p:nvPr/>
+      </p:nvGrpSpPr>
+      <p:grpSpPr>
+        <a:xfrm>
+          <a:off x="0" y="0"/>
+          <a:ext cx="0" cy="0"/>
+          <a:chOff x="0" y="0"/>
+          <a:chExt cx="0" cy="0"/>
+        </a:xfrm>
+      </p:grpSpPr>
+      <p:sp>
+        <p:nvSpPr>
+          <p:cNvPr id="2" name="Title 1"/>
+          <p:cNvSpPr>
+            <a:spLocks noGrp="1"/>
+          </p:cNvSpPr>
+          <p:nvPr>
+            <p:ph type="title"/>
+          </p:nvPr>
+        </p:nvSpPr>
+        <p:spPr/>
+        <p:txBody>
+          <a:bodyPr/>
+          <a:lstStyle/>
+          <a:p>
+            <a:r>
+              <a:rPr lang="pt-BR" dirty="0" smtClean="0"/>
               <a:t>Bibliografias</a:t>
             </a:r>
             <a:endParaRPr lang="pt-BR" dirty="0"/>
@@ -6267,7 +6352,7 @@
 </p:sld>
 </file>
 
-<file path=ppt/slides/slide8.xml><?xml version="1.0" encoding="utf-8"?>
+<file path=ppt/slides/slide9.xml><?xml version="1.0" encoding="utf-8"?>
 <p:sld xmlns:a="http://schemas.openxmlformats.org/drawingml/2006/main" xmlns:r="http://schemas.openxmlformats.org/officeDocument/2006/relationships" xmlns:p="http://schemas.openxmlformats.org/presentationml/2006/main">
   <p:cSld>
     <p:spTree>

</xml_diff>

<commit_message>
Deletando slides de teste e acrescentando minha parte do trabalho
</commit_message>
<xml_diff>
--- a/Curso de Introdução à linguagem Scala.pptx
+++ b/Curso de Introdução à linguagem Scala.pptx
@@ -6,14 +6,17 @@
   </p:sldMasterIdLst>
   <p:sldIdLst>
     <p:sldId id="256" r:id="rId2"/>
-    <p:sldId id="265" r:id="rId3"/>
-    <p:sldId id="262" r:id="rId4"/>
-    <p:sldId id="257" r:id="rId5"/>
-    <p:sldId id="264" r:id="rId6"/>
-    <p:sldId id="258" r:id="rId7"/>
-    <p:sldId id="259" r:id="rId8"/>
-    <p:sldId id="260" r:id="rId9"/>
-    <p:sldId id="261" r:id="rId10"/>
+    <p:sldId id="257" r:id="rId3"/>
+    <p:sldId id="258" r:id="rId4"/>
+    <p:sldId id="262" r:id="rId5"/>
+    <p:sldId id="263" r:id="rId6"/>
+    <p:sldId id="265" r:id="rId7"/>
+    <p:sldId id="264" r:id="rId8"/>
+    <p:sldId id="266" r:id="rId9"/>
+    <p:sldId id="267" r:id="rId10"/>
+    <p:sldId id="259" r:id="rId11"/>
+    <p:sldId id="260" r:id="rId12"/>
+    <p:sldId id="261" r:id="rId13"/>
   </p:sldIdLst>
   <p:sldSz cx="12192000" cy="6858000"/>
   <p:notesSz cx="6858000" cy="9144000"/>
@@ -5810,6 +5813,238 @@
 </p:sld>
 </file>
 
+<file path=ppt/slides/slide10.xml><?xml version="1.0" encoding="utf-8"?>
+<p:sld xmlns:a="http://schemas.openxmlformats.org/drawingml/2006/main" xmlns:r="http://schemas.openxmlformats.org/officeDocument/2006/relationships" xmlns:p="http://schemas.openxmlformats.org/presentationml/2006/main">
+  <p:cSld>
+    <p:spTree>
+      <p:nvGrpSpPr>
+        <p:cNvPr id="1" name=""/>
+        <p:cNvGrpSpPr/>
+        <p:nvPr/>
+      </p:nvGrpSpPr>
+      <p:grpSpPr>
+        <a:xfrm>
+          <a:off x="0" y="0"/>
+          <a:ext cx="0" cy="0"/>
+          <a:chOff x="0" y="0"/>
+          <a:chExt cx="0" cy="0"/>
+        </a:xfrm>
+      </p:grpSpPr>
+      <p:sp>
+        <p:nvSpPr>
+          <p:cNvPr id="2" name="Title 1"/>
+          <p:cNvSpPr>
+            <a:spLocks noGrp="1"/>
+          </p:cNvSpPr>
+          <p:nvPr>
+            <p:ph type="title"/>
+          </p:nvPr>
+        </p:nvSpPr>
+        <p:spPr/>
+        <p:txBody>
+          <a:bodyPr/>
+          <a:lstStyle/>
+          <a:p>
+            <a:r>
+              <a:rPr lang="pt-BR" dirty="0" smtClean="0"/>
+              <a:t>Conclusão</a:t>
+            </a:r>
+            <a:endParaRPr lang="pt-BR" dirty="0"/>
+          </a:p>
+        </p:txBody>
+      </p:sp>
+      <p:sp>
+        <p:nvSpPr>
+          <p:cNvPr id="3" name="Content Placeholder 2"/>
+          <p:cNvSpPr>
+            <a:spLocks noGrp="1"/>
+          </p:cNvSpPr>
+          <p:nvPr>
+            <p:ph idx="1"/>
+          </p:nvPr>
+        </p:nvSpPr>
+        <p:spPr/>
+        <p:txBody>
+          <a:bodyPr/>
+          <a:lstStyle/>
+          <a:p>
+            <a:r>
+              <a:rPr lang="pt-BR" dirty="0" smtClean="0"/>
+              <a:t>[Colocar aqui um texto com a parte da conclusão do curso]</a:t>
+            </a:r>
+          </a:p>
+          <a:p>
+            <a:endParaRPr lang="pt-BR" dirty="0"/>
+          </a:p>
+        </p:txBody>
+      </p:sp>
+    </p:spTree>
+    <p:extLst>
+      <p:ext uri="{BB962C8B-B14F-4D97-AF65-F5344CB8AC3E}">
+        <p14:creationId xmlns:p14="http://schemas.microsoft.com/office/powerpoint/2010/main" val="142990780"/>
+      </p:ext>
+    </p:extLst>
+  </p:cSld>
+  <p:clrMapOvr>
+    <a:masterClrMapping/>
+  </p:clrMapOvr>
+</p:sld>
+</file>
+
+<file path=ppt/slides/slide11.xml><?xml version="1.0" encoding="utf-8"?>
+<p:sld xmlns:a="http://schemas.openxmlformats.org/drawingml/2006/main" xmlns:r="http://schemas.openxmlformats.org/officeDocument/2006/relationships" xmlns:p="http://schemas.openxmlformats.org/presentationml/2006/main">
+  <p:cSld>
+    <p:spTree>
+      <p:nvGrpSpPr>
+        <p:cNvPr id="1" name=""/>
+        <p:cNvGrpSpPr/>
+        <p:nvPr/>
+      </p:nvGrpSpPr>
+      <p:grpSpPr>
+        <a:xfrm>
+          <a:off x="0" y="0"/>
+          <a:ext cx="0" cy="0"/>
+          <a:chOff x="0" y="0"/>
+          <a:chExt cx="0" cy="0"/>
+        </a:xfrm>
+      </p:grpSpPr>
+      <p:sp>
+        <p:nvSpPr>
+          <p:cNvPr id="2" name="Title 1"/>
+          <p:cNvSpPr>
+            <a:spLocks noGrp="1"/>
+          </p:cNvSpPr>
+          <p:nvPr>
+            <p:ph type="title"/>
+          </p:nvPr>
+        </p:nvSpPr>
+        <p:spPr/>
+        <p:txBody>
+          <a:bodyPr/>
+          <a:lstStyle/>
+          <a:p>
+            <a:r>
+              <a:rPr lang="pt-BR" dirty="0" smtClean="0"/>
+              <a:t>Bibliografias</a:t>
+            </a:r>
+            <a:endParaRPr lang="pt-BR" dirty="0"/>
+          </a:p>
+        </p:txBody>
+      </p:sp>
+      <p:sp>
+        <p:nvSpPr>
+          <p:cNvPr id="3" name="Content Placeholder 2"/>
+          <p:cNvSpPr>
+            <a:spLocks noGrp="1"/>
+          </p:cNvSpPr>
+          <p:nvPr>
+            <p:ph idx="1"/>
+          </p:nvPr>
+        </p:nvSpPr>
+        <p:spPr/>
+        <p:txBody>
+          <a:bodyPr/>
+          <a:lstStyle/>
+          <a:p>
+            <a:r>
+              <a:rPr lang="pt-BR" dirty="0" smtClean="0"/>
+              <a:t>[CADA UM colocar aqui a sua bibliografia]</a:t>
+            </a:r>
+            <a:endParaRPr lang="pt-BR" dirty="0"/>
+          </a:p>
+        </p:txBody>
+      </p:sp>
+    </p:spTree>
+    <p:extLst>
+      <p:ext uri="{BB962C8B-B14F-4D97-AF65-F5344CB8AC3E}">
+        <p14:creationId xmlns:p14="http://schemas.microsoft.com/office/powerpoint/2010/main" val="3281224344"/>
+      </p:ext>
+    </p:extLst>
+  </p:cSld>
+  <p:clrMapOvr>
+    <a:masterClrMapping/>
+  </p:clrMapOvr>
+</p:sld>
+</file>
+
+<file path=ppt/slides/slide12.xml><?xml version="1.0" encoding="utf-8"?>
+<p:sld xmlns:a="http://schemas.openxmlformats.org/drawingml/2006/main" xmlns:r="http://schemas.openxmlformats.org/officeDocument/2006/relationships" xmlns:p="http://schemas.openxmlformats.org/presentationml/2006/main">
+  <p:cSld>
+    <p:spTree>
+      <p:nvGrpSpPr>
+        <p:cNvPr id="1" name=""/>
+        <p:cNvGrpSpPr/>
+        <p:nvPr/>
+      </p:nvGrpSpPr>
+      <p:grpSpPr>
+        <a:xfrm>
+          <a:off x="0" y="0"/>
+          <a:ext cx="0" cy="0"/>
+          <a:chOff x="0" y="0"/>
+          <a:chExt cx="0" cy="0"/>
+        </a:xfrm>
+      </p:grpSpPr>
+      <p:sp>
+        <p:nvSpPr>
+          <p:cNvPr id="2" name="Title 1"/>
+          <p:cNvSpPr>
+            <a:spLocks noGrp="1"/>
+          </p:cNvSpPr>
+          <p:nvPr>
+            <p:ph type="title"/>
+          </p:nvPr>
+        </p:nvSpPr>
+        <p:spPr/>
+        <p:txBody>
+          <a:bodyPr/>
+          <a:lstStyle/>
+          <a:p>
+            <a:r>
+              <a:rPr lang="pt-BR" dirty="0" smtClean="0"/>
+              <a:t>Alunos</a:t>
+            </a:r>
+            <a:endParaRPr lang="pt-BR" dirty="0"/>
+          </a:p>
+        </p:txBody>
+      </p:sp>
+      <p:sp>
+        <p:nvSpPr>
+          <p:cNvPr id="3" name="Content Placeholder 2"/>
+          <p:cNvSpPr>
+            <a:spLocks noGrp="1"/>
+          </p:cNvSpPr>
+          <p:nvPr>
+            <p:ph idx="1"/>
+          </p:nvPr>
+        </p:nvSpPr>
+        <p:spPr/>
+        <p:txBody>
+          <a:bodyPr/>
+          <a:lstStyle/>
+          <a:p>
+            <a:r>
+              <a:rPr lang="pt-BR" dirty="0" smtClean="0"/>
+              <a:t>[Coloque aqui seu nome e R.A.]</a:t>
+            </a:r>
+          </a:p>
+          <a:p>
+            <a:endParaRPr lang="pt-BR" dirty="0"/>
+          </a:p>
+        </p:txBody>
+      </p:sp>
+    </p:spTree>
+    <p:extLst>
+      <p:ext uri="{BB962C8B-B14F-4D97-AF65-F5344CB8AC3E}">
+        <p14:creationId xmlns:p14="http://schemas.microsoft.com/office/powerpoint/2010/main" val="2493652849"/>
+      </p:ext>
+    </p:extLst>
+  </p:cSld>
+  <p:clrMapOvr>
+    <a:masterClrMapping/>
+  </p:clrMapOvr>
+</p:sld>
+</file>
+
 <file path=ppt/slides/slide2.xml><?xml version="1.0" encoding="utf-8"?>
 <p:sld xmlns:a="http://schemas.openxmlformats.org/drawingml/2006/main" xmlns:r="http://schemas.openxmlformats.org/officeDocument/2006/relationships" xmlns:p="http://schemas.openxmlformats.org/presentationml/2006/main">
   <p:cSld>
@@ -5844,47 +6079,39 @@
           <a:p>
             <a:r>
               <a:rPr lang="pt-BR" dirty="0" smtClean="0"/>
-              <a:t>Elton, s </a:t>
-            </a:r>
-            <a:r>
-              <a:rPr lang="pt-BR" dirty="0" err="1" smtClean="0"/>
-              <a:t>vc</a:t>
-            </a:r>
+              <a:t>Introdução</a:t>
+            </a:r>
+            <a:endParaRPr lang="pt-BR" dirty="0"/>
+          </a:p>
+        </p:txBody>
+      </p:sp>
+      <p:sp>
+        <p:nvSpPr>
+          <p:cNvPr id="3" name="Content Placeholder 2"/>
+          <p:cNvSpPr>
+            <a:spLocks noGrp="1"/>
+          </p:cNvSpPr>
+          <p:nvPr>
+            <p:ph idx="1"/>
+          </p:nvPr>
+        </p:nvSpPr>
+        <p:spPr/>
+        <p:txBody>
+          <a:bodyPr/>
+          <a:lstStyle/>
+          <a:p>
             <a:r>
               <a:rPr lang="pt-BR" dirty="0" smtClean="0"/>
-              <a:t> viu esse slide então funcionou</a:t>
+              <a:t>[Colocar aqui um texto com a parte introdutória do curso]</a:t>
             </a:r>
             <a:endParaRPr lang="pt-BR" dirty="0"/>
-          </a:p>
-        </p:txBody>
-      </p:sp>
-      <p:sp>
-        <p:nvSpPr>
-          <p:cNvPr id="3" name="Content Placeholder 2"/>
-          <p:cNvSpPr>
-            <a:spLocks noGrp="1"/>
-          </p:cNvSpPr>
-          <p:nvPr>
-            <p:ph idx="1"/>
-          </p:nvPr>
-        </p:nvSpPr>
-        <p:spPr/>
-        <p:txBody>
-          <a:bodyPr/>
-          <a:lstStyle/>
-          <a:p>
-            <a:r>
-              <a:rPr lang="pt-BR" smtClean="0"/>
-              <a:t>123</a:t>
-            </a:r>
-            <a:endParaRPr lang="pt-BR"/>
           </a:p>
         </p:txBody>
       </p:sp>
     </p:spTree>
     <p:extLst>
       <p:ext uri="{BB962C8B-B14F-4D97-AF65-F5344CB8AC3E}">
-        <p14:creationId xmlns:p14="http://schemas.microsoft.com/office/powerpoint/2010/main" val="3296201914"/>
+        <p14:creationId xmlns:p14="http://schemas.microsoft.com/office/powerpoint/2010/main" val="2930776956"/>
       </p:ext>
     </p:extLst>
   </p:cSld>
@@ -5928,7 +6155,7 @@
           <a:p>
             <a:r>
               <a:rPr lang="pt-BR" dirty="0" smtClean="0"/>
-              <a:t>Teste</a:t>
+              <a:t>[Tópicos]</a:t>
             </a:r>
             <a:endParaRPr lang="pt-BR" dirty="0"/>
           </a:p>
@@ -5950,8 +6177,8 @@
           <a:lstStyle/>
           <a:p>
             <a:r>
-              <a:rPr lang="pt-BR" dirty="0" err="1" smtClean="0"/>
-              <a:t>aowwww</a:t>
+              <a:rPr lang="pt-BR" dirty="0" smtClean="0"/>
+              <a:t>[Aqui cada um coloca sua parte do trabalho(com o seu devido tópico, prestar atenção na numeração dos tópicos, se existir), na sua respectiva ordem e já formatando conforme combinado]</a:t>
             </a:r>
             <a:endParaRPr lang="pt-BR" dirty="0"/>
           </a:p>
@@ -5960,7 +6187,7 @@
     </p:spTree>
     <p:extLst>
       <p:ext uri="{BB962C8B-B14F-4D97-AF65-F5344CB8AC3E}">
-        <p14:creationId xmlns:p14="http://schemas.microsoft.com/office/powerpoint/2010/main" val="4191969745"/>
+        <p14:creationId xmlns:p14="http://schemas.microsoft.com/office/powerpoint/2010/main" val="1919137567"/>
       </p:ext>
     </p:extLst>
   </p:cSld>
@@ -6004,31 +6231,181 @@
           <a:p>
             <a:r>
               <a:rPr lang="pt-BR" dirty="0" smtClean="0"/>
-              <a:t>Introdução</a:t>
+              <a:t>Estrutura básica</a:t>
             </a:r>
             <a:endParaRPr lang="pt-BR" dirty="0"/>
           </a:p>
         </p:txBody>
       </p:sp>
-      <p:sp>
-        <p:nvSpPr>
-          <p:cNvPr id="3" name="Content Placeholder 2"/>
-          <p:cNvSpPr>
-            <a:spLocks noGrp="1"/>
-          </p:cNvSpPr>
+      <p:pic>
+        <p:nvPicPr>
+          <p:cNvPr id="4" name="Content Placeholder 3"/>
+          <p:cNvPicPr>
+            <a:picLocks noGrp="1" noChangeAspect="1"/>
+          </p:cNvPicPr>
           <p:nvPr>
             <p:ph idx="1"/>
           </p:nvPr>
-        </p:nvSpPr>
-        <p:spPr/>
-        <p:txBody>
-          <a:bodyPr/>
-          <a:lstStyle/>
-          <a:p>
+        </p:nvPicPr>
+        <p:blipFill>
+          <a:blip r:embed="rId2">
+            <a:extLst>
+              <a:ext uri="{28A0092B-C50C-407E-A947-70E740481C1C}">
+                <a14:useLocalDpi xmlns:a14="http://schemas.microsoft.com/office/drawing/2010/main" val="0"/>
+              </a:ext>
+            </a:extLst>
+          </a:blip>
+          <a:stretch>
+            <a:fillRect/>
+          </a:stretch>
+        </p:blipFill>
+        <p:spPr>
+          <a:xfrm>
+            <a:off x="81608" y="2514600"/>
+            <a:ext cx="5143500" cy="1948083"/>
+          </a:xfrm>
+        </p:spPr>
+      </p:pic>
+      <p:sp>
+        <p:nvSpPr>
+          <p:cNvPr id="5" name="TextBox 4"/>
+          <p:cNvSpPr txBox="1"/>
+          <p:nvPr/>
+        </p:nvSpPr>
+        <p:spPr>
+          <a:xfrm>
+            <a:off x="5803641" y="2239347"/>
+            <a:ext cx="5803641" cy="3416320"/>
+          </a:xfrm>
+          <a:prstGeom prst="rect">
+            <a:avLst/>
+          </a:prstGeom>
+          <a:noFill/>
+        </p:spPr>
+        <p:txBody>
+          <a:bodyPr wrap="square" rtlCol="0">
+            <a:spAutoFit/>
+          </a:bodyPr>
+          <a:lstStyle/>
+          <a:p>
+            <a:pPr marL="285750" indent="-285750">
+              <a:buFont typeface="Arial" panose="020B0604020202020204" pitchFamily="34" charset="0"/>
+              <a:buChar char="•"/>
+            </a:pPr>
             <a:r>
               <a:rPr lang="pt-BR" dirty="0" smtClean="0"/>
-              <a:t>[Colocar aqui um texto com a parte introdutória do curso]</a:t>
-            </a:r>
+              <a:t>Linguagem Scala é bem parecida com Java</a:t>
+            </a:r>
+          </a:p>
+          <a:p>
+            <a:pPr marL="285750" indent="-285750">
+              <a:buFont typeface="Arial" panose="020B0604020202020204" pitchFamily="34" charset="0"/>
+              <a:buChar char="•"/>
+            </a:pPr>
+            <a:endParaRPr lang="pt-BR" dirty="0" smtClean="0"/>
+          </a:p>
+          <a:p>
+            <a:pPr marL="285750" indent="-285750">
+              <a:buFont typeface="Arial" panose="020B0604020202020204" pitchFamily="34" charset="0"/>
+              <a:buChar char="•"/>
+            </a:pPr>
+            <a:r>
+              <a:rPr lang="pt-BR" dirty="0" smtClean="0"/>
+              <a:t>Fácil integração com Java</a:t>
+            </a:r>
+          </a:p>
+          <a:p>
+            <a:pPr marL="285750" indent="-285750">
+              <a:buFont typeface="Arial" panose="020B0604020202020204" pitchFamily="34" charset="0"/>
+              <a:buChar char="•"/>
+            </a:pPr>
+            <a:endParaRPr lang="pt-BR" dirty="0" smtClean="0"/>
+          </a:p>
+          <a:p>
+            <a:pPr marL="285750" indent="-285750">
+              <a:buFont typeface="Arial" panose="020B0604020202020204" pitchFamily="34" charset="0"/>
+              <a:buChar char="•"/>
+            </a:pPr>
+            <a:r>
+              <a:rPr lang="pt-BR" dirty="0" err="1" smtClean="0"/>
+              <a:t>Object</a:t>
+            </a:r>
+            <a:r>
+              <a:rPr lang="pt-BR" dirty="0" smtClean="0"/>
+              <a:t> é comumente chamado </a:t>
+            </a:r>
+            <a:r>
+              <a:rPr lang="pt-BR" dirty="0" err="1" smtClean="0"/>
+              <a:t>singleton</a:t>
+            </a:r>
+            <a:r>
+              <a:rPr lang="pt-BR" dirty="0" smtClean="0"/>
+              <a:t>, que é uma classe que só possui uma instância</a:t>
+            </a:r>
+          </a:p>
+          <a:p>
+            <a:pPr marL="285750" indent="-285750">
+              <a:buFont typeface="Arial" panose="020B0604020202020204" pitchFamily="34" charset="0"/>
+              <a:buChar char="•"/>
+            </a:pPr>
+            <a:endParaRPr lang="pt-BR" dirty="0" smtClean="0"/>
+          </a:p>
+          <a:p>
+            <a:pPr marL="285750" indent="-285750">
+              <a:buFont typeface="Arial" panose="020B0604020202020204" pitchFamily="34" charset="0"/>
+              <a:buChar char="•"/>
+            </a:pPr>
+            <a:r>
+              <a:rPr lang="pt-BR" dirty="0" smtClean="0"/>
+              <a:t>Na linguagem Scala, </a:t>
+            </a:r>
+            <a:r>
+              <a:rPr lang="pt-BR" dirty="0" err="1" smtClean="0"/>
+              <a:t>public</a:t>
+            </a:r>
+            <a:r>
+              <a:rPr lang="pt-BR" dirty="0" smtClean="0"/>
+              <a:t> </a:t>
+            </a:r>
+            <a:r>
+              <a:rPr lang="pt-BR" dirty="0" err="1" smtClean="0"/>
+              <a:t>static</a:t>
+            </a:r>
+            <a:r>
+              <a:rPr lang="pt-BR" dirty="0" smtClean="0"/>
+              <a:t> </a:t>
+            </a:r>
+            <a:r>
+              <a:rPr lang="pt-BR" dirty="0" err="1" smtClean="0"/>
+              <a:t>void</a:t>
+            </a:r>
+            <a:r>
+              <a:rPr lang="pt-BR" dirty="0" smtClean="0"/>
+              <a:t> não está explicito </a:t>
+            </a:r>
+          </a:p>
+          <a:p>
+            <a:pPr marL="285750" indent="-285750">
+              <a:buFont typeface="Arial" panose="020B0604020202020204" pitchFamily="34" charset="0"/>
+              <a:buChar char="•"/>
+            </a:pPr>
+            <a:endParaRPr lang="pt-BR" dirty="0" smtClean="0"/>
+          </a:p>
+          <a:p>
+            <a:pPr marL="285750" indent="-285750">
+              <a:buFont typeface="Arial" panose="020B0604020202020204" pitchFamily="34" charset="0"/>
+              <a:buChar char="•"/>
+            </a:pPr>
+            <a:r>
+              <a:rPr lang="pt-BR" dirty="0" smtClean="0"/>
+              <a:t>Funções também são objetos em Scala</a:t>
+            </a:r>
+          </a:p>
+          <a:p>
+            <a:pPr marL="285750" indent="-285750">
+              <a:buFont typeface="Arial" panose="020B0604020202020204" pitchFamily="34" charset="0"/>
+              <a:buChar char="•"/>
+            </a:pPr>
             <a:endParaRPr lang="pt-BR" dirty="0"/>
           </a:p>
         </p:txBody>
@@ -6036,7 +6413,7 @@
     </p:spTree>
     <p:extLst>
       <p:ext uri="{BB962C8B-B14F-4D97-AF65-F5344CB8AC3E}">
-        <p14:creationId xmlns:p14="http://schemas.microsoft.com/office/powerpoint/2010/main" val="2930776956"/>
+        <p14:creationId xmlns:p14="http://schemas.microsoft.com/office/powerpoint/2010/main" val="1204476944"/>
       </p:ext>
     </p:extLst>
   </p:cSld>
@@ -6080,39 +6457,79 @@
           <a:p>
             <a:r>
               <a:rPr lang="pt-BR" dirty="0" smtClean="0"/>
-              <a:t>Slide 5</a:t>
+              <a:t>Variáveis</a:t>
             </a:r>
             <a:endParaRPr lang="pt-BR" dirty="0"/>
           </a:p>
         </p:txBody>
       </p:sp>
-      <p:sp>
-        <p:nvSpPr>
-          <p:cNvPr id="3" name="Content Placeholder 2"/>
-          <p:cNvSpPr>
-            <a:spLocks noGrp="1"/>
-          </p:cNvSpPr>
+      <p:pic>
+        <p:nvPicPr>
+          <p:cNvPr id="4" name="Content Placeholder 3"/>
+          <p:cNvPicPr>
+            <a:picLocks noGrp="1" noChangeAspect="1"/>
+          </p:cNvPicPr>
           <p:nvPr>
             <p:ph idx="1"/>
           </p:nvPr>
-        </p:nvSpPr>
-        <p:spPr/>
-        <p:txBody>
-          <a:bodyPr/>
-          <a:lstStyle/>
-          <a:p>
-            <a:r>
-              <a:rPr lang="pt-BR" smtClean="0"/>
-              <a:t>rtygh</a:t>
-            </a:r>
-            <a:endParaRPr lang="pt-BR"/>
+        </p:nvPicPr>
+        <p:blipFill>
+          <a:blip r:embed="rId2">
+            <a:extLst>
+              <a:ext uri="{28A0092B-C50C-407E-A947-70E740481C1C}">
+                <a14:useLocalDpi xmlns:a14="http://schemas.microsoft.com/office/drawing/2010/main" val="0"/>
+              </a:ext>
+            </a:extLst>
+          </a:blip>
+          <a:stretch>
+            <a:fillRect/>
+          </a:stretch>
+        </p:blipFill>
+        <p:spPr>
+          <a:xfrm>
+            <a:off x="85628" y="2514600"/>
+            <a:ext cx="4627721" cy="3124200"/>
+          </a:xfrm>
+        </p:spPr>
+      </p:pic>
+      <p:sp>
+        <p:nvSpPr>
+          <p:cNvPr id="5" name="TextBox 4"/>
+          <p:cNvSpPr txBox="1"/>
+          <p:nvPr/>
+        </p:nvSpPr>
+        <p:spPr>
+          <a:xfrm>
+            <a:off x="5701004" y="2136710"/>
+            <a:ext cx="5635690" cy="1200329"/>
+          </a:xfrm>
+          <a:prstGeom prst="rect">
+            <a:avLst/>
+          </a:prstGeom>
+          <a:noFill/>
+        </p:spPr>
+        <p:txBody>
+          <a:bodyPr wrap="square" rtlCol="0">
+            <a:spAutoFit/>
+          </a:bodyPr>
+          <a:lstStyle/>
+          <a:p>
+            <a:pPr marL="285750" indent="-285750">
+              <a:buFont typeface="Arial" panose="020B0604020202020204" pitchFamily="34" charset="0"/>
+              <a:buChar char="•"/>
+            </a:pPr>
+            <a:r>
+              <a:rPr lang="pt-BR" dirty="0" smtClean="0"/>
+              <a:t>Umas das diferenças mais notórias da linguagem Scala em relação ao Java é que não é preciso especificar o tipo primitivo da variável/constante</a:t>
+            </a:r>
+            <a:endParaRPr lang="pt-BR" dirty="0"/>
           </a:p>
         </p:txBody>
       </p:sp>
     </p:spTree>
     <p:extLst>
       <p:ext uri="{BB962C8B-B14F-4D97-AF65-F5344CB8AC3E}">
-        <p14:creationId xmlns:p14="http://schemas.microsoft.com/office/powerpoint/2010/main" val="934884477"/>
+        <p14:creationId xmlns:p14="http://schemas.microsoft.com/office/powerpoint/2010/main" val="1133998690"/>
       </p:ext>
     </p:extLst>
   </p:cSld>
@@ -6156,30 +6573,158 @@
           <a:p>
             <a:r>
               <a:rPr lang="pt-BR" dirty="0" smtClean="0"/>
-              <a:t>[Tópicos]</a:t>
+              <a:t>Algumas das operações possíveis </a:t>
+            </a:r>
+            <a:r>
+              <a:rPr lang="pt-BR" dirty="0"/>
+              <a:t>d</a:t>
+            </a:r>
+            <a:r>
+              <a:rPr lang="pt-BR" dirty="0" smtClean="0"/>
+              <a:t>a Scala</a:t>
             </a:r>
             <a:endParaRPr lang="pt-BR" dirty="0"/>
           </a:p>
         </p:txBody>
       </p:sp>
-      <p:sp>
-        <p:nvSpPr>
-          <p:cNvPr id="3" name="Content Placeholder 2"/>
-          <p:cNvSpPr>
-            <a:spLocks noGrp="1"/>
-          </p:cNvSpPr>
+      <p:pic>
+        <p:nvPicPr>
+          <p:cNvPr id="4" name="Content Placeholder 3"/>
+          <p:cNvPicPr>
+            <a:picLocks noGrp="1" noChangeAspect="1"/>
+          </p:cNvPicPr>
           <p:nvPr>
             <p:ph idx="1"/>
           </p:nvPr>
-        </p:nvSpPr>
-        <p:spPr/>
-        <p:txBody>
-          <a:bodyPr/>
-          <a:lstStyle/>
-          <a:p>
+        </p:nvPicPr>
+        <p:blipFill>
+          <a:blip r:embed="rId2">
+            <a:extLst>
+              <a:ext uri="{28A0092B-C50C-407E-A947-70E740481C1C}">
+                <a14:useLocalDpi xmlns:a14="http://schemas.microsoft.com/office/drawing/2010/main" val="0"/>
+              </a:ext>
+            </a:extLst>
+          </a:blip>
+          <a:stretch>
+            <a:fillRect/>
+          </a:stretch>
+        </p:blipFill>
+        <p:spPr>
+          <a:xfrm>
+            <a:off x="88343" y="2514600"/>
+            <a:ext cx="5940755" cy="3876869"/>
+          </a:xfrm>
+        </p:spPr>
+      </p:pic>
+      <p:sp>
+        <p:nvSpPr>
+          <p:cNvPr id="5" name="TextBox 4"/>
+          <p:cNvSpPr txBox="1"/>
+          <p:nvPr/>
+        </p:nvSpPr>
+        <p:spPr>
+          <a:xfrm>
+            <a:off x="6848669" y="2892490"/>
+            <a:ext cx="4506686" cy="3693319"/>
+          </a:xfrm>
+          <a:prstGeom prst="rect">
+            <a:avLst/>
+          </a:prstGeom>
+          <a:noFill/>
+        </p:spPr>
+        <p:txBody>
+          <a:bodyPr wrap="square" rtlCol="0">
+            <a:spAutoFit/>
+          </a:bodyPr>
+          <a:lstStyle/>
+          <a:p>
+            <a:pPr marL="285750" indent="-285750">
+              <a:buFont typeface="Arial" panose="020B0604020202020204" pitchFamily="34" charset="0"/>
+              <a:buChar char="•"/>
+            </a:pPr>
             <a:r>
               <a:rPr lang="pt-BR" dirty="0" smtClean="0"/>
-              <a:t>[Aqui cada um coloca sua parte do trabalho(com o seu devido tópico, prestar atenção na numeração dos tópicos, se existir), na sua respectiva ordem e já formatando conforme combinado]</a:t>
+              <a:t>Números são objetos, então eles podem ter métodos, por exemplo:</a:t>
+            </a:r>
+          </a:p>
+          <a:p>
+            <a:pPr marL="285750" indent="-285750">
+              <a:buFont typeface="Arial" panose="020B0604020202020204" pitchFamily="34" charset="0"/>
+              <a:buChar char="•"/>
+            </a:pPr>
+            <a:endParaRPr lang="pt-BR" dirty="0"/>
+          </a:p>
+          <a:p>
+            <a:pPr marL="285750" indent="-285750">
+              <a:buFont typeface="Arial" panose="020B0604020202020204" pitchFamily="34" charset="0"/>
+              <a:buChar char="•"/>
+            </a:pPr>
+            <a:r>
+              <a:rPr lang="pt-BR" dirty="0"/>
+              <a:t>1 + 2 * 3 / </a:t>
+            </a:r>
+            <a:r>
+              <a:rPr lang="pt-BR" dirty="0" smtClean="0"/>
+              <a:t>x, pode ser escrito:</a:t>
+            </a:r>
+          </a:p>
+          <a:p>
+            <a:pPr marL="285750" indent="-285750">
+              <a:buFont typeface="Arial" panose="020B0604020202020204" pitchFamily="34" charset="0"/>
+              <a:buChar char="•"/>
+            </a:pPr>
+            <a:endParaRPr lang="pt-BR" dirty="0"/>
+          </a:p>
+          <a:p>
+            <a:pPr marL="285750" indent="-285750">
+              <a:buFont typeface="Arial" panose="020B0604020202020204" pitchFamily="34" charset="0"/>
+              <a:buChar char="•"/>
+            </a:pPr>
+            <a:r>
+              <a:rPr lang="pt-BR" dirty="0"/>
+              <a:t>1.+(2.*(3./(x</a:t>
+            </a:r>
+            <a:r>
+              <a:rPr lang="pt-BR" dirty="0" smtClean="0"/>
+              <a:t>)))</a:t>
+            </a:r>
+          </a:p>
+          <a:p>
+            <a:pPr marL="285750" indent="-285750">
+              <a:buFont typeface="Arial" panose="020B0604020202020204" pitchFamily="34" charset="0"/>
+              <a:buChar char="•"/>
+            </a:pPr>
+            <a:endParaRPr lang="pt-BR" dirty="0"/>
+          </a:p>
+          <a:p>
+            <a:pPr marL="285750" indent="-285750">
+              <a:buFont typeface="Arial" panose="020B0604020202020204" pitchFamily="34" charset="0"/>
+              <a:buChar char="•"/>
+            </a:pPr>
+            <a:r>
+              <a:rPr lang="pt-BR" dirty="0"/>
+              <a:t>Isso quer dizer que +, *, etc. são identificadores válidos em Scala</a:t>
+            </a:r>
+            <a:r>
+              <a:rPr lang="pt-BR" dirty="0" smtClean="0"/>
+              <a:t>.</a:t>
+            </a:r>
+          </a:p>
+          <a:p>
+            <a:pPr marL="285750" indent="-285750">
+              <a:buFont typeface="Arial" panose="020B0604020202020204" pitchFamily="34" charset="0"/>
+              <a:buChar char="•"/>
+            </a:pPr>
+            <a:endParaRPr lang="pt-BR" dirty="0"/>
+          </a:p>
+          <a:p>
+            <a:pPr marL="285750" indent="-285750">
+              <a:buFont typeface="Arial" panose="020B0604020202020204" pitchFamily="34" charset="0"/>
+              <a:buChar char="•"/>
+            </a:pPr>
+            <a:r>
+              <a:rPr lang="pt-BR" dirty="0" smtClean="0"/>
+              <a:t>Os operadores são parecidos como em Java, outros exemplos de operadores são: &amp;&amp;, ||, &lt;,&gt;,&lt;=,&gt;=</a:t>
             </a:r>
             <a:endParaRPr lang="pt-BR" dirty="0"/>
           </a:p>
@@ -6188,7 +6733,7 @@
     </p:spTree>
     <p:extLst>
       <p:ext uri="{BB962C8B-B14F-4D97-AF65-F5344CB8AC3E}">
-        <p14:creationId xmlns:p14="http://schemas.microsoft.com/office/powerpoint/2010/main" val="1919137567"/>
+        <p14:creationId xmlns:p14="http://schemas.microsoft.com/office/powerpoint/2010/main" val="1111765481"/>
       </p:ext>
     </p:extLst>
   </p:cSld>
@@ -6232,33 +6777,88 @@
           <a:p>
             <a:r>
               <a:rPr lang="pt-BR" dirty="0" smtClean="0"/>
-              <a:t>Conclusão</a:t>
+              <a:t>As vezes vai ser preciso formatar um numero</a:t>
             </a:r>
             <a:endParaRPr lang="pt-BR" dirty="0"/>
           </a:p>
         </p:txBody>
       </p:sp>
-      <p:sp>
-        <p:nvSpPr>
-          <p:cNvPr id="3" name="Content Placeholder 2"/>
-          <p:cNvSpPr>
-            <a:spLocks noGrp="1"/>
-          </p:cNvSpPr>
+      <p:pic>
+        <p:nvPicPr>
+          <p:cNvPr id="4" name="Content Placeholder 3"/>
+          <p:cNvPicPr>
+            <a:picLocks noGrp="1" noChangeAspect="1"/>
+          </p:cNvPicPr>
           <p:nvPr>
             <p:ph idx="1"/>
           </p:nvPr>
-        </p:nvSpPr>
-        <p:spPr/>
-        <p:txBody>
-          <a:bodyPr/>
-          <a:lstStyle/>
-          <a:p>
+        </p:nvPicPr>
+        <p:blipFill>
+          <a:blip r:embed="rId2">
+            <a:extLst>
+              <a:ext uri="{28A0092B-C50C-407E-A947-70E740481C1C}">
+                <a14:useLocalDpi xmlns:a14="http://schemas.microsoft.com/office/drawing/2010/main" val="0"/>
+              </a:ext>
+            </a:extLst>
+          </a:blip>
+          <a:stretch>
+            <a:fillRect/>
+          </a:stretch>
+        </p:blipFill>
+        <p:spPr>
+          <a:xfrm>
+            <a:off x="80315" y="2514600"/>
+            <a:ext cx="6299200" cy="2959100"/>
+          </a:xfrm>
+        </p:spPr>
+      </p:pic>
+      <p:sp>
+        <p:nvSpPr>
+          <p:cNvPr id="5" name="TextBox 4"/>
+          <p:cNvSpPr txBox="1"/>
+          <p:nvPr/>
+        </p:nvSpPr>
+        <p:spPr>
+          <a:xfrm>
+            <a:off x="6503437" y="2514600"/>
+            <a:ext cx="5206481" cy="1477328"/>
+          </a:xfrm>
+          <a:prstGeom prst="rect">
+            <a:avLst/>
+          </a:prstGeom>
+          <a:noFill/>
+        </p:spPr>
+        <p:txBody>
+          <a:bodyPr wrap="square" rtlCol="0">
+            <a:spAutoFit/>
+          </a:bodyPr>
+          <a:lstStyle/>
+          <a:p>
+            <a:pPr marL="285750" indent="-285750">
+              <a:buFont typeface="Arial" panose="020B0604020202020204" pitchFamily="34" charset="0"/>
+              <a:buChar char="•"/>
+            </a:pPr>
             <a:r>
               <a:rPr lang="pt-BR" dirty="0" smtClean="0"/>
-              <a:t>[Colocar aqui um texto com a parte da conclusão do curso]</a:t>
-            </a:r>
-          </a:p>
-          <a:p>
+              <a:t>Nesse caso a formatação é bem parecida com a linguagem Python</a:t>
+            </a:r>
+          </a:p>
+          <a:p>
+            <a:pPr marL="285750" indent="-285750">
+              <a:buFont typeface="Arial" panose="020B0604020202020204" pitchFamily="34" charset="0"/>
+              <a:buChar char="•"/>
+            </a:pPr>
+            <a:endParaRPr lang="pt-BR" dirty="0"/>
+          </a:p>
+          <a:p>
+            <a:pPr marL="285750" indent="-285750">
+              <a:buFont typeface="Arial" panose="020B0604020202020204" pitchFamily="34" charset="0"/>
+              <a:buChar char="•"/>
+            </a:pPr>
+            <a:r>
+              <a:rPr lang="pt-BR" dirty="0" smtClean="0"/>
+              <a:t>Scala fornece uma forma reduzida de formatação</a:t>
+            </a:r>
             <a:endParaRPr lang="pt-BR" dirty="0"/>
           </a:p>
         </p:txBody>
@@ -6266,7 +6866,7 @@
     </p:spTree>
     <p:extLst>
       <p:ext uri="{BB962C8B-B14F-4D97-AF65-F5344CB8AC3E}">
-        <p14:creationId xmlns:p14="http://schemas.microsoft.com/office/powerpoint/2010/main" val="142990780"/>
+        <p14:creationId xmlns:p14="http://schemas.microsoft.com/office/powerpoint/2010/main" val="2015418294"/>
       </p:ext>
     </p:extLst>
   </p:cSld>
@@ -6310,30 +6910,91 @@
           <a:p>
             <a:r>
               <a:rPr lang="pt-BR" dirty="0" smtClean="0"/>
-              <a:t>Bibliografias</a:t>
+              <a:t>Recebendo entradas de um usuário</a:t>
             </a:r>
             <a:endParaRPr lang="pt-BR" dirty="0"/>
           </a:p>
         </p:txBody>
       </p:sp>
-      <p:sp>
-        <p:nvSpPr>
-          <p:cNvPr id="3" name="Content Placeholder 2"/>
-          <p:cNvSpPr>
-            <a:spLocks noGrp="1"/>
-          </p:cNvSpPr>
+      <p:pic>
+        <p:nvPicPr>
+          <p:cNvPr id="4" name="Content Placeholder 3"/>
+          <p:cNvPicPr>
+            <a:picLocks noGrp="1" noChangeAspect="1"/>
+          </p:cNvPicPr>
           <p:nvPr>
             <p:ph idx="1"/>
           </p:nvPr>
-        </p:nvSpPr>
-        <p:spPr/>
-        <p:txBody>
-          <a:bodyPr/>
-          <a:lstStyle/>
-          <a:p>
+        </p:nvPicPr>
+        <p:blipFill>
+          <a:blip r:embed="rId2">
+            <a:extLst>
+              <a:ext uri="{28A0092B-C50C-407E-A947-70E740481C1C}">
+                <a14:useLocalDpi xmlns:a14="http://schemas.microsoft.com/office/drawing/2010/main" val="0"/>
+              </a:ext>
+            </a:extLst>
+          </a:blip>
+          <a:stretch>
+            <a:fillRect/>
+          </a:stretch>
+        </p:blipFill>
+        <p:spPr>
+          <a:xfrm>
+            <a:off x="83555" y="2505269"/>
+            <a:ext cx="6690469" cy="2540000"/>
+          </a:xfrm>
+        </p:spPr>
+      </p:pic>
+      <p:sp>
+        <p:nvSpPr>
+          <p:cNvPr id="5" name="TextBox 4"/>
+          <p:cNvSpPr txBox="1"/>
+          <p:nvPr/>
+        </p:nvSpPr>
+        <p:spPr>
+          <a:xfrm>
+            <a:off x="7063273" y="2761860"/>
+            <a:ext cx="4488025" cy="2031325"/>
+          </a:xfrm>
+          <a:prstGeom prst="rect">
+            <a:avLst/>
+          </a:prstGeom>
+          <a:noFill/>
+        </p:spPr>
+        <p:txBody>
+          <a:bodyPr wrap="square" rtlCol="0">
+            <a:spAutoFit/>
+          </a:bodyPr>
+          <a:lstStyle/>
+          <a:p>
+            <a:pPr marL="285750" indent="-285750">
+              <a:buFont typeface="Arial" panose="020B0604020202020204" pitchFamily="34" charset="0"/>
+              <a:buChar char="•"/>
+            </a:pPr>
             <a:r>
               <a:rPr lang="pt-BR" dirty="0" smtClean="0"/>
-              <a:t>[CADA UM colocar aqui a sua bibliografia]</a:t>
+              <a:t>Diferente do Java, em Scala não é necessário instanciar uma classe</a:t>
+            </a:r>
+          </a:p>
+          <a:p>
+            <a:pPr marL="285750" indent="-285750">
+              <a:buFont typeface="Arial" panose="020B0604020202020204" pitchFamily="34" charset="0"/>
+              <a:buChar char="•"/>
+            </a:pPr>
+            <a:endParaRPr lang="pt-BR" dirty="0"/>
+          </a:p>
+          <a:p>
+            <a:pPr marL="285750" indent="-285750">
+              <a:buFont typeface="Arial" panose="020B0604020202020204" pitchFamily="34" charset="0"/>
+              <a:buChar char="•"/>
+            </a:pPr>
+            <a:r>
+              <a:rPr lang="pt-BR" dirty="0" smtClean="0"/>
+              <a:t>Como em Scala todos tipos primitivos são objetos eu consigo acessar os métodos da variável </a:t>
+            </a:r>
+            <a:r>
+              <a:rPr lang="pt-BR" dirty="0" err="1" smtClean="0"/>
+              <a:t>anoNasc</a:t>
             </a:r>
             <a:endParaRPr lang="pt-BR" dirty="0"/>
           </a:p>
@@ -6342,7 +7003,7 @@
     </p:spTree>
     <p:extLst>
       <p:ext uri="{BB962C8B-B14F-4D97-AF65-F5344CB8AC3E}">
-        <p14:creationId xmlns:p14="http://schemas.microsoft.com/office/powerpoint/2010/main" val="3281224344"/>
+        <p14:creationId xmlns:p14="http://schemas.microsoft.com/office/powerpoint/2010/main" val="1431616613"/>
       </p:ext>
     </p:extLst>
   </p:cSld>
@@ -6385,34 +7046,100 @@
           <a:lstStyle/>
           <a:p>
             <a:r>
+              <a:rPr lang="pt-BR" dirty="0" err="1" smtClean="0"/>
+              <a:t>If</a:t>
+            </a:r>
+            <a:r>
               <a:rPr lang="pt-BR" dirty="0" smtClean="0"/>
-              <a:t>Alunos</a:t>
+              <a:t>, </a:t>
+            </a:r>
+            <a:r>
+              <a:rPr lang="pt-BR" dirty="0" err="1" smtClean="0"/>
+              <a:t>else</a:t>
+            </a:r>
+            <a:r>
+              <a:rPr lang="pt-BR" dirty="0" smtClean="0"/>
+              <a:t> </a:t>
+            </a:r>
+            <a:r>
+              <a:rPr lang="pt-BR" dirty="0" err="1" smtClean="0"/>
+              <a:t>if</a:t>
+            </a:r>
+            <a:r>
+              <a:rPr lang="pt-BR" dirty="0" smtClean="0"/>
+              <a:t> e </a:t>
+            </a:r>
+            <a:r>
+              <a:rPr lang="pt-BR" dirty="0" err="1" smtClean="0"/>
+              <a:t>else</a:t>
             </a:r>
             <a:endParaRPr lang="pt-BR" dirty="0"/>
           </a:p>
         </p:txBody>
       </p:sp>
-      <p:sp>
-        <p:nvSpPr>
-          <p:cNvPr id="3" name="Content Placeholder 2"/>
-          <p:cNvSpPr>
-            <a:spLocks noGrp="1"/>
-          </p:cNvSpPr>
+      <p:pic>
+        <p:nvPicPr>
+          <p:cNvPr id="4" name="Content Placeholder 3"/>
+          <p:cNvPicPr>
+            <a:picLocks noGrp="1" noChangeAspect="1"/>
+          </p:cNvPicPr>
           <p:nvPr>
             <p:ph idx="1"/>
           </p:nvPr>
-        </p:nvSpPr>
-        <p:spPr/>
-        <p:txBody>
-          <a:bodyPr/>
-          <a:lstStyle/>
-          <a:p>
+        </p:nvPicPr>
+        <p:blipFill>
+          <a:blip r:embed="rId2">
+            <a:extLst>
+              <a:ext uri="{28A0092B-C50C-407E-A947-70E740481C1C}">
+                <a14:useLocalDpi xmlns:a14="http://schemas.microsoft.com/office/drawing/2010/main" val="0"/>
+              </a:ext>
+            </a:extLst>
+          </a:blip>
+          <a:stretch>
+            <a:fillRect/>
+          </a:stretch>
+        </p:blipFill>
+        <p:spPr>
+          <a:xfrm>
+            <a:off x="82696" y="2514600"/>
+            <a:ext cx="3607217" cy="3124200"/>
+          </a:xfrm>
+        </p:spPr>
+      </p:pic>
+      <p:sp>
+        <p:nvSpPr>
+          <p:cNvPr id="5" name="TextBox 4"/>
+          <p:cNvSpPr txBox="1"/>
+          <p:nvPr/>
+        </p:nvSpPr>
+        <p:spPr>
+          <a:xfrm>
+            <a:off x="5505061" y="2514600"/>
+            <a:ext cx="5971592" cy="369332"/>
+          </a:xfrm>
+          <a:prstGeom prst="rect">
+            <a:avLst/>
+          </a:prstGeom>
+          <a:noFill/>
+        </p:spPr>
+        <p:txBody>
+          <a:bodyPr wrap="square" rtlCol="0">
+            <a:spAutoFit/>
+          </a:bodyPr>
+          <a:lstStyle/>
+          <a:p>
+            <a:pPr marL="285750" indent="-285750">
+              <a:buFont typeface="Arial" panose="020B0604020202020204" pitchFamily="34" charset="0"/>
+              <a:buChar char="•"/>
+            </a:pPr>
+            <a:r>
+              <a:rPr lang="pt-BR" dirty="0" err="1" smtClean="0"/>
+              <a:t>Syntax</a:t>
+            </a:r>
             <a:r>
               <a:rPr lang="pt-BR" dirty="0" smtClean="0"/>
-              <a:t>[Coloque aqui seu nome e R.A.]</a:t>
-            </a:r>
-          </a:p>
-          <a:p>
+              <a:t> semelhante ao do Java</a:t>
+            </a:r>
             <a:endParaRPr lang="pt-BR" dirty="0"/>
           </a:p>
         </p:txBody>
@@ -6420,7 +7147,7 @@
     </p:spTree>
     <p:extLst>
       <p:ext uri="{BB962C8B-B14F-4D97-AF65-F5344CB8AC3E}">
-        <p14:creationId xmlns:p14="http://schemas.microsoft.com/office/powerpoint/2010/main" val="2493652849"/>
+        <p14:creationId xmlns:p14="http://schemas.microsoft.com/office/powerpoint/2010/main" val="3493535863"/>
       </p:ext>
     </p:extLst>
   </p:cSld>

</xml_diff>